<commit_message>
Add new resources for Scikit-learn
</commit_message>
<xml_diff>
--- a/CNN and Segmentation/CNN.pptx
+++ b/CNN and Segmentation/CNN.pptx
@@ -489,6 +489,11 @@
         </p:txBody>
       </p:sp>
     </p:spTree>
+    <p:extLst>
+      <p:ext uri="{BB962C8B-B14F-4D97-AF65-F5344CB8AC3E}">
+        <p14:creationId xmlns:p14="http://schemas.microsoft.com/office/powerpoint/2010/main" val="490125336"/>
+      </p:ext>
+    </p:extLst>
   </p:cSld>
   <p:clrMap bg1="lt1" tx1="dk1" bg2="dk2" tx2="lt2" accent1="accent1" accent2="accent2" accent3="accent3" accent4="accent4" accent5="accent5" accent6="accent6" hlink="hlink" folHlink="folHlink"/>
   <p:notesStyle>
@@ -820,6 +825,11 @@
         </p:txBody>
       </p:sp>
     </p:spTree>
+    <p:extLst>
+      <p:ext uri="{BB962C8B-B14F-4D97-AF65-F5344CB8AC3E}">
+        <p14:creationId xmlns:p14="http://schemas.microsoft.com/office/powerpoint/2010/main" val="3430184980"/>
+      </p:ext>
+    </p:extLst>
   </p:cSld>
   <p:clrMapOvr>
     <a:masterClrMapping/>
@@ -924,6 +934,11 @@
         </p:txBody>
       </p:sp>
     </p:spTree>
+    <p:extLst>
+      <p:ext uri="{BB962C8B-B14F-4D97-AF65-F5344CB8AC3E}">
+        <p14:creationId xmlns:p14="http://schemas.microsoft.com/office/powerpoint/2010/main" val="2860212614"/>
+      </p:ext>
+    </p:extLst>
   </p:cSld>
   <p:clrMapOvr>
     <a:masterClrMapping/>
@@ -1028,6 +1043,11 @@
         </p:txBody>
       </p:sp>
     </p:spTree>
+    <p:extLst>
+      <p:ext uri="{BB962C8B-B14F-4D97-AF65-F5344CB8AC3E}">
+        <p14:creationId xmlns:p14="http://schemas.microsoft.com/office/powerpoint/2010/main" val="1673419629"/>
+      </p:ext>
+    </p:extLst>
   </p:cSld>
   <p:clrMapOvr>
     <a:masterClrMapping/>
@@ -1132,6 +1152,11 @@
         </p:txBody>
       </p:sp>
     </p:spTree>
+    <p:extLst>
+      <p:ext uri="{BB962C8B-B14F-4D97-AF65-F5344CB8AC3E}">
+        <p14:creationId xmlns:p14="http://schemas.microsoft.com/office/powerpoint/2010/main" val="2878888439"/>
+      </p:ext>
+    </p:extLst>
   </p:cSld>
   <p:clrMapOvr>
     <a:masterClrMapping/>
@@ -1345,6 +1370,11 @@
         </p:txBody>
       </p:sp>
     </p:spTree>
+    <p:extLst>
+      <p:ext uri="{BB962C8B-B14F-4D97-AF65-F5344CB8AC3E}">
+        <p14:creationId xmlns:p14="http://schemas.microsoft.com/office/powerpoint/2010/main" val="1849634868"/>
+      </p:ext>
+    </p:extLst>
   </p:cSld>
   <p:clrMapOvr>
     <a:masterClrMapping/>
@@ -4486,7 +4516,7 @@
           <p:cNvPr id="2" name="Slide Number Placeholder 1">
             <a:extLst>
               <a:ext uri="{FF2B5EF4-FFF2-40B4-BE49-F238E27FC236}">
-                <a16:creationId xmlns:a16="http://schemas.microsoft.com/office/drawing/2014/main" id="{51F83D49-5874-45F1-BFA0-C25D807E3585}"/>
+                <a16:creationId xmlns:a16="http://schemas.microsoft.com/office/drawing/2014/main" xmlns="" id="{51F83D49-5874-45F1-BFA0-C25D807E3585}"/>
               </a:ext>
             </a:extLst>
           </p:cNvPr>
@@ -4524,7 +4554,7 @@
           <p:cNvPr id="3" name="TextBox 2">
             <a:extLst>
               <a:ext uri="{FF2B5EF4-FFF2-40B4-BE49-F238E27FC236}">
-                <a16:creationId xmlns:a16="http://schemas.microsoft.com/office/drawing/2014/main" id="{7399B515-F869-4712-AC6C-C1195C2C8306}"/>
+                <a16:creationId xmlns:a16="http://schemas.microsoft.com/office/drawing/2014/main" xmlns="" id="{7399B515-F869-4712-AC6C-C1195C2C8306}"/>
               </a:ext>
             </a:extLst>
           </p:cNvPr>
@@ -4565,7 +4595,7 @@
                 <a:hlinkClick r:id="rId2" tooltip="Grayscale">
                   <a:extLst>
                     <a:ext uri="{A12FA001-AC4F-418D-AE19-62706E023703}">
-                      <ahyp:hlinkClr xmlns:ahyp="http://schemas.microsoft.com/office/drawing/2018/hyperlinkcolor" val="tx"/>
+                      <ahyp:hlinkClr xmlns:ahyp="http://schemas.microsoft.com/office/drawing/2018/hyperlinkcolor" xmlns="" val="tx"/>
                     </a:ext>
                   </a:extLst>
                 </a:hlinkClick>
@@ -4589,7 +4619,7 @@
           <p:cNvPr id="5" name="Picture 4">
             <a:extLst>
               <a:ext uri="{FF2B5EF4-FFF2-40B4-BE49-F238E27FC236}">
-                <a16:creationId xmlns:a16="http://schemas.microsoft.com/office/drawing/2014/main" id="{520EA3B9-5322-42A5-9A57-B74F4E4743B8}"/>
+                <a16:creationId xmlns:a16="http://schemas.microsoft.com/office/drawing/2014/main" xmlns="" id="{520EA3B9-5322-42A5-9A57-B74F4E4743B8}"/>
               </a:ext>
             </a:extLst>
           </p:cNvPr>
@@ -4649,7 +4679,7 @@
           <p:cNvPr id="2" name="Slide Number Placeholder 1">
             <a:extLst>
               <a:ext uri="{FF2B5EF4-FFF2-40B4-BE49-F238E27FC236}">
-                <a16:creationId xmlns:a16="http://schemas.microsoft.com/office/drawing/2014/main" id="{DF2F2FF8-D328-484E-A8CC-E4DD4C948652}"/>
+                <a16:creationId xmlns:a16="http://schemas.microsoft.com/office/drawing/2014/main" xmlns="" id="{DF2F2FF8-D328-484E-A8CC-E4DD4C948652}"/>
               </a:ext>
             </a:extLst>
           </p:cNvPr>
@@ -4687,7 +4717,7 @@
           <p:cNvPr id="3" name="TextBox 2">
             <a:extLst>
               <a:ext uri="{FF2B5EF4-FFF2-40B4-BE49-F238E27FC236}">
-                <a16:creationId xmlns:a16="http://schemas.microsoft.com/office/drawing/2014/main" id="{C213D130-A4F9-4750-A427-B6656C897970}"/>
+                <a16:creationId xmlns:a16="http://schemas.microsoft.com/office/drawing/2014/main" xmlns="" id="{C213D130-A4F9-4750-A427-B6656C897970}"/>
               </a:ext>
             </a:extLst>
           </p:cNvPr>
@@ -4730,7 +4760,7 @@
           <p:cNvPr id="4" name="TextBox 3">
             <a:extLst>
               <a:ext uri="{FF2B5EF4-FFF2-40B4-BE49-F238E27FC236}">
-                <a16:creationId xmlns:a16="http://schemas.microsoft.com/office/drawing/2014/main" id="{57A7A35C-C9B1-4C0B-BBBF-B3768CD891B6}"/>
+                <a16:creationId xmlns:a16="http://schemas.microsoft.com/office/drawing/2014/main" xmlns="" id="{57A7A35C-C9B1-4C0B-BBBF-B3768CD891B6}"/>
               </a:ext>
             </a:extLst>
           </p:cNvPr>
@@ -4797,7 +4827,7 @@
           <p:cNvPr id="6" name="Picture 5">
             <a:extLst>
               <a:ext uri="{FF2B5EF4-FFF2-40B4-BE49-F238E27FC236}">
-                <a16:creationId xmlns:a16="http://schemas.microsoft.com/office/drawing/2014/main" id="{DC46771C-525B-4E14-B871-68935E211F06}"/>
+                <a16:creationId xmlns:a16="http://schemas.microsoft.com/office/drawing/2014/main" xmlns="" id="{DC46771C-525B-4E14-B871-68935E211F06}"/>
               </a:ext>
             </a:extLst>
           </p:cNvPr>
@@ -4827,7 +4857,7 @@
           <p:cNvPr id="8" name="Picture 7">
             <a:extLst>
               <a:ext uri="{FF2B5EF4-FFF2-40B4-BE49-F238E27FC236}">
-                <a16:creationId xmlns:a16="http://schemas.microsoft.com/office/drawing/2014/main" id="{31120DD8-84D0-4447-B8EE-1DCD8559BA7F}"/>
+                <a16:creationId xmlns:a16="http://schemas.microsoft.com/office/drawing/2014/main" xmlns="" id="{31120DD8-84D0-4447-B8EE-1DCD8559BA7F}"/>
               </a:ext>
             </a:extLst>
           </p:cNvPr>
@@ -4857,7 +4887,7 @@
           <p:cNvPr id="10" name="Picture 9">
             <a:extLst>
               <a:ext uri="{FF2B5EF4-FFF2-40B4-BE49-F238E27FC236}">
-                <a16:creationId xmlns:a16="http://schemas.microsoft.com/office/drawing/2014/main" id="{09AE7F84-3BBB-4150-930C-F2CE51F3E3FF}"/>
+                <a16:creationId xmlns:a16="http://schemas.microsoft.com/office/drawing/2014/main" xmlns="" id="{09AE7F84-3BBB-4150-930C-F2CE51F3E3FF}"/>
               </a:ext>
             </a:extLst>
           </p:cNvPr>
@@ -4887,7 +4917,7 @@
           <p:cNvPr id="11" name="TextBox 10">
             <a:extLst>
               <a:ext uri="{FF2B5EF4-FFF2-40B4-BE49-F238E27FC236}">
-                <a16:creationId xmlns:a16="http://schemas.microsoft.com/office/drawing/2014/main" id="{E7D621C8-30D7-4A40-964F-B2F1E8AFF82F}"/>
+                <a16:creationId xmlns:a16="http://schemas.microsoft.com/office/drawing/2014/main" xmlns="" id="{E7D621C8-30D7-4A40-964F-B2F1E8AFF82F}"/>
               </a:ext>
             </a:extLst>
           </p:cNvPr>
@@ -4922,7 +4952,7 @@
           <p:cNvPr id="12" name="TextBox 11">
             <a:extLst>
               <a:ext uri="{FF2B5EF4-FFF2-40B4-BE49-F238E27FC236}">
-                <a16:creationId xmlns:a16="http://schemas.microsoft.com/office/drawing/2014/main" id="{B4DF98E8-F547-4FB5-941F-C3B807D2A9D9}"/>
+                <a16:creationId xmlns:a16="http://schemas.microsoft.com/office/drawing/2014/main" xmlns="" id="{B4DF98E8-F547-4FB5-941F-C3B807D2A9D9}"/>
               </a:ext>
             </a:extLst>
           </p:cNvPr>
@@ -4987,7 +5017,7 @@
           <p:cNvPr id="2" name="Slide Number Placeholder 1">
             <a:extLst>
               <a:ext uri="{FF2B5EF4-FFF2-40B4-BE49-F238E27FC236}">
-                <a16:creationId xmlns:a16="http://schemas.microsoft.com/office/drawing/2014/main" id="{2CE2E8AE-998A-47CC-8EB0-07DCC0943929}"/>
+                <a16:creationId xmlns:a16="http://schemas.microsoft.com/office/drawing/2014/main" xmlns="" id="{2CE2E8AE-998A-47CC-8EB0-07DCC0943929}"/>
               </a:ext>
             </a:extLst>
           </p:cNvPr>
@@ -5025,7 +5055,7 @@
           <p:cNvPr id="3" name="TextBox 2">
             <a:extLst>
               <a:ext uri="{FF2B5EF4-FFF2-40B4-BE49-F238E27FC236}">
-                <a16:creationId xmlns:a16="http://schemas.microsoft.com/office/drawing/2014/main" id="{ACA67C58-4DB9-410F-A254-D22DE4BFBB31}"/>
+                <a16:creationId xmlns:a16="http://schemas.microsoft.com/office/drawing/2014/main" xmlns="" id="{ACA67C58-4DB9-410F-A254-D22DE4BFBB31}"/>
               </a:ext>
             </a:extLst>
           </p:cNvPr>
@@ -5173,7 +5203,7 @@
           <p:cNvPr id="5" name="Picture 4">
             <a:extLst>
               <a:ext uri="{FF2B5EF4-FFF2-40B4-BE49-F238E27FC236}">
-                <a16:creationId xmlns:a16="http://schemas.microsoft.com/office/drawing/2014/main" id="{7169DF29-A3A2-40CC-92C0-26A94979B6DB}"/>
+                <a16:creationId xmlns:a16="http://schemas.microsoft.com/office/drawing/2014/main" xmlns="" id="{7169DF29-A3A2-40CC-92C0-26A94979B6DB}"/>
               </a:ext>
             </a:extLst>
           </p:cNvPr>
@@ -5203,7 +5233,7 @@
           <p:cNvPr id="7" name="Picture 6">
             <a:extLst>
               <a:ext uri="{FF2B5EF4-FFF2-40B4-BE49-F238E27FC236}">
-                <a16:creationId xmlns:a16="http://schemas.microsoft.com/office/drawing/2014/main" id="{53344111-29C7-4C67-BEDF-6FB576F491D2}"/>
+                <a16:creationId xmlns:a16="http://schemas.microsoft.com/office/drawing/2014/main" xmlns="" id="{53344111-29C7-4C67-BEDF-6FB576F491D2}"/>
               </a:ext>
             </a:extLst>
           </p:cNvPr>
@@ -5233,7 +5263,7 @@
           <p:cNvPr id="8" name="TextBox 7">
             <a:extLst>
               <a:ext uri="{FF2B5EF4-FFF2-40B4-BE49-F238E27FC236}">
-                <a16:creationId xmlns:a16="http://schemas.microsoft.com/office/drawing/2014/main" id="{2147EDF5-6C6F-4B18-BC6F-9B0A8AEA7C2B}"/>
+                <a16:creationId xmlns:a16="http://schemas.microsoft.com/office/drawing/2014/main" xmlns="" id="{2147EDF5-6C6F-4B18-BC6F-9B0A8AEA7C2B}"/>
               </a:ext>
             </a:extLst>
           </p:cNvPr>
@@ -5303,7 +5333,7 @@
           <p:cNvPr id="2" name="Slide Number Placeholder 1">
             <a:extLst>
               <a:ext uri="{FF2B5EF4-FFF2-40B4-BE49-F238E27FC236}">
-                <a16:creationId xmlns:a16="http://schemas.microsoft.com/office/drawing/2014/main" id="{85D6CB71-10A0-4CDE-8BD2-CF5D175E79E6}"/>
+                <a16:creationId xmlns:a16="http://schemas.microsoft.com/office/drawing/2014/main" xmlns="" id="{85D6CB71-10A0-4CDE-8BD2-CF5D175E79E6}"/>
               </a:ext>
             </a:extLst>
           </p:cNvPr>
@@ -5341,7 +5371,7 @@
           <p:cNvPr id="3" name="TextBox 2">
             <a:extLst>
               <a:ext uri="{FF2B5EF4-FFF2-40B4-BE49-F238E27FC236}">
-                <a16:creationId xmlns:a16="http://schemas.microsoft.com/office/drawing/2014/main" id="{2765C3B0-C309-4440-9724-BFEF6013FD1F}"/>
+                <a16:creationId xmlns:a16="http://schemas.microsoft.com/office/drawing/2014/main" xmlns="" id="{2765C3B0-C309-4440-9724-BFEF6013FD1F}"/>
               </a:ext>
             </a:extLst>
           </p:cNvPr>
@@ -5399,7 +5429,7 @@
           <p:cNvPr id="4" name="TextBox 3">
             <a:extLst>
               <a:ext uri="{FF2B5EF4-FFF2-40B4-BE49-F238E27FC236}">
-                <a16:creationId xmlns:a16="http://schemas.microsoft.com/office/drawing/2014/main" id="{42D4F31B-87BE-4258-80DD-F0F3C8CD9C43}"/>
+                <a16:creationId xmlns:a16="http://schemas.microsoft.com/office/drawing/2014/main" xmlns="" id="{42D4F31B-87BE-4258-80DD-F0F3C8CD9C43}"/>
               </a:ext>
             </a:extLst>
           </p:cNvPr>
@@ -5439,7 +5469,7 @@
           <p:cNvPr id="5" name="TextBox 4">
             <a:extLst>
               <a:ext uri="{FF2B5EF4-FFF2-40B4-BE49-F238E27FC236}">
-                <a16:creationId xmlns:a16="http://schemas.microsoft.com/office/drawing/2014/main" id="{FD4032E2-23AB-4AE5-9C53-ECA420FBC9CC}"/>
+                <a16:creationId xmlns:a16="http://schemas.microsoft.com/office/drawing/2014/main" xmlns="" id="{FD4032E2-23AB-4AE5-9C53-ECA420FBC9CC}"/>
               </a:ext>
             </a:extLst>
           </p:cNvPr>
@@ -5479,7 +5509,7 @@
           <p:cNvPr id="7" name="Picture 6">
             <a:extLst>
               <a:ext uri="{FF2B5EF4-FFF2-40B4-BE49-F238E27FC236}">
-                <a16:creationId xmlns:a16="http://schemas.microsoft.com/office/drawing/2014/main" id="{B0742603-3088-4EFD-89FD-0CB7460961CE}"/>
+                <a16:creationId xmlns:a16="http://schemas.microsoft.com/office/drawing/2014/main" xmlns="" id="{B0742603-3088-4EFD-89FD-0CB7460961CE}"/>
               </a:ext>
             </a:extLst>
           </p:cNvPr>
@@ -5509,7 +5539,7 @@
           <p:cNvPr id="8" name="TextBox 7">
             <a:extLst>
               <a:ext uri="{FF2B5EF4-FFF2-40B4-BE49-F238E27FC236}">
-                <a16:creationId xmlns:a16="http://schemas.microsoft.com/office/drawing/2014/main" id="{EAE8E4BE-590A-4C2C-9F52-96B53816D6F3}"/>
+                <a16:creationId xmlns:a16="http://schemas.microsoft.com/office/drawing/2014/main" xmlns="" id="{EAE8E4BE-590A-4C2C-9F52-96B53816D6F3}"/>
               </a:ext>
             </a:extLst>
           </p:cNvPr>
@@ -5549,7 +5579,7 @@
           <p:cNvPr id="9" name="TextBox 8">
             <a:extLst>
               <a:ext uri="{FF2B5EF4-FFF2-40B4-BE49-F238E27FC236}">
-                <a16:creationId xmlns:a16="http://schemas.microsoft.com/office/drawing/2014/main" id="{0CD6A4F9-E73F-44BC-8A4E-E754D39ADDB0}"/>
+                <a16:creationId xmlns:a16="http://schemas.microsoft.com/office/drawing/2014/main" xmlns="" id="{0CD6A4F9-E73F-44BC-8A4E-E754D39ADDB0}"/>
               </a:ext>
             </a:extLst>
           </p:cNvPr>
@@ -5619,7 +5649,7 @@
           <p:cNvPr id="5" name="Picture 4">
             <a:extLst>
               <a:ext uri="{FF2B5EF4-FFF2-40B4-BE49-F238E27FC236}">
-                <a16:creationId xmlns:a16="http://schemas.microsoft.com/office/drawing/2014/main" id="{620B85CB-BA30-47F3-9EB5-1E48BBCBA22F}"/>
+                <a16:creationId xmlns:a16="http://schemas.microsoft.com/office/drawing/2014/main" xmlns="" id="{620B85CB-BA30-47F3-9EB5-1E48BBCBA22F}"/>
               </a:ext>
             </a:extLst>
           </p:cNvPr>
@@ -5649,7 +5679,7 @@
           <p:cNvPr id="6" name="TextBox 5">
             <a:extLst>
               <a:ext uri="{FF2B5EF4-FFF2-40B4-BE49-F238E27FC236}">
-                <a16:creationId xmlns:a16="http://schemas.microsoft.com/office/drawing/2014/main" id="{CD566758-6F3E-43E8-847E-E8EAD8E18D39}"/>
+                <a16:creationId xmlns:a16="http://schemas.microsoft.com/office/drawing/2014/main" xmlns="" id="{CD566758-6F3E-43E8-847E-E8EAD8E18D39}"/>
               </a:ext>
             </a:extLst>
           </p:cNvPr>
@@ -5754,7 +5784,7 @@
           <p:cNvPr id="2" name="Slide Number Placeholder 1">
             <a:extLst>
               <a:ext uri="{FF2B5EF4-FFF2-40B4-BE49-F238E27FC236}">
-                <a16:creationId xmlns:a16="http://schemas.microsoft.com/office/drawing/2014/main" id="{05D50F94-B1DA-4A40-936C-383B18F351DB}"/>
+                <a16:creationId xmlns:a16="http://schemas.microsoft.com/office/drawing/2014/main" xmlns="" id="{05D50F94-B1DA-4A40-936C-383B18F351DB}"/>
               </a:ext>
             </a:extLst>
           </p:cNvPr>
@@ -5792,7 +5822,7 @@
           <p:cNvPr id="3" name="TextBox 2">
             <a:extLst>
               <a:ext uri="{FF2B5EF4-FFF2-40B4-BE49-F238E27FC236}">
-                <a16:creationId xmlns:a16="http://schemas.microsoft.com/office/drawing/2014/main" id="{8C4E2F71-B2ED-4A5B-9912-30FA71EF6BD5}"/>
+                <a16:creationId xmlns:a16="http://schemas.microsoft.com/office/drawing/2014/main" xmlns="" id="{8C4E2F71-B2ED-4A5B-9912-30FA71EF6BD5}"/>
               </a:ext>
             </a:extLst>
           </p:cNvPr>
@@ -5898,7 +5928,7 @@
           <p:cNvPr id="5" name="Picture 4">
             <a:extLst>
               <a:ext uri="{FF2B5EF4-FFF2-40B4-BE49-F238E27FC236}">
-                <a16:creationId xmlns:a16="http://schemas.microsoft.com/office/drawing/2014/main" id="{E329B346-E95A-436F-891D-D5EE8C88BAE5}"/>
+                <a16:creationId xmlns:a16="http://schemas.microsoft.com/office/drawing/2014/main" xmlns="" id="{E329B346-E95A-436F-891D-D5EE8C88BAE5}"/>
               </a:ext>
             </a:extLst>
           </p:cNvPr>
@@ -5958,7 +5988,7 @@
           <p:cNvPr id="5" name="Picture 4">
             <a:extLst>
               <a:ext uri="{FF2B5EF4-FFF2-40B4-BE49-F238E27FC236}">
-                <a16:creationId xmlns:a16="http://schemas.microsoft.com/office/drawing/2014/main" id="{620B85CB-BA30-47F3-9EB5-1E48BBCBA22F}"/>
+                <a16:creationId xmlns:a16="http://schemas.microsoft.com/office/drawing/2014/main" xmlns="" id="{620B85CB-BA30-47F3-9EB5-1E48BBCBA22F}"/>
               </a:ext>
             </a:extLst>
           </p:cNvPr>
@@ -5988,7 +6018,7 @@
           <p:cNvPr id="6" name="TextBox 5">
             <a:extLst>
               <a:ext uri="{FF2B5EF4-FFF2-40B4-BE49-F238E27FC236}">
-                <a16:creationId xmlns:a16="http://schemas.microsoft.com/office/drawing/2014/main" id="{CD566758-6F3E-43E8-847E-E8EAD8E18D39}"/>
+                <a16:creationId xmlns:a16="http://schemas.microsoft.com/office/drawing/2014/main" xmlns="" id="{CD566758-6F3E-43E8-847E-E8EAD8E18D39}"/>
               </a:ext>
             </a:extLst>
           </p:cNvPr>
@@ -6087,7 +6117,7 @@
           <p:cNvPr id="2" name="Slide Number Placeholder 1">
             <a:extLst>
               <a:ext uri="{FF2B5EF4-FFF2-40B4-BE49-F238E27FC236}">
-                <a16:creationId xmlns:a16="http://schemas.microsoft.com/office/drawing/2014/main" id="{750509BF-800D-40AB-9EA6-F201A9672758}"/>
+                <a16:creationId xmlns:a16="http://schemas.microsoft.com/office/drawing/2014/main" xmlns="" id="{750509BF-800D-40AB-9EA6-F201A9672758}"/>
               </a:ext>
             </a:extLst>
           </p:cNvPr>
@@ -6125,7 +6155,7 @@
           <p:cNvPr id="4" name="Picture 3">
             <a:extLst>
               <a:ext uri="{FF2B5EF4-FFF2-40B4-BE49-F238E27FC236}">
-                <a16:creationId xmlns:a16="http://schemas.microsoft.com/office/drawing/2014/main" id="{A085C821-5EF7-4BF7-9E4C-A8D7660ABCAB}"/>
+                <a16:creationId xmlns:a16="http://schemas.microsoft.com/office/drawing/2014/main" xmlns="" id="{A085C821-5EF7-4BF7-9E4C-A8D7660ABCAB}"/>
               </a:ext>
             </a:extLst>
           </p:cNvPr>
@@ -6185,7 +6215,7 @@
           <p:cNvPr id="2" name="Slide Number Placeholder 1">
             <a:extLst>
               <a:ext uri="{FF2B5EF4-FFF2-40B4-BE49-F238E27FC236}">
-                <a16:creationId xmlns:a16="http://schemas.microsoft.com/office/drawing/2014/main" id="{750509BF-800D-40AB-9EA6-F201A9672758}"/>
+                <a16:creationId xmlns:a16="http://schemas.microsoft.com/office/drawing/2014/main" xmlns="" id="{750509BF-800D-40AB-9EA6-F201A9672758}"/>
               </a:ext>
             </a:extLst>
           </p:cNvPr>
@@ -6223,7 +6253,7 @@
           <p:cNvPr id="4" name="Picture 3">
             <a:extLst>
               <a:ext uri="{FF2B5EF4-FFF2-40B4-BE49-F238E27FC236}">
-                <a16:creationId xmlns:a16="http://schemas.microsoft.com/office/drawing/2014/main" id="{A085C821-5EF7-4BF7-9E4C-A8D7660ABCAB}"/>
+                <a16:creationId xmlns:a16="http://schemas.microsoft.com/office/drawing/2014/main" xmlns="" id="{A085C821-5EF7-4BF7-9E4C-A8D7660ABCAB}"/>
               </a:ext>
             </a:extLst>
           </p:cNvPr>
@@ -6283,7 +6313,7 @@
           <p:cNvPr id="2" name="Slide Number Placeholder 1">
             <a:extLst>
               <a:ext uri="{FF2B5EF4-FFF2-40B4-BE49-F238E27FC236}">
-                <a16:creationId xmlns:a16="http://schemas.microsoft.com/office/drawing/2014/main" id="{F46FE868-D268-4A05-A571-2EF1771CFCE7}"/>
+                <a16:creationId xmlns:a16="http://schemas.microsoft.com/office/drawing/2014/main" xmlns="" id="{F46FE868-D268-4A05-A571-2EF1771CFCE7}"/>
               </a:ext>
             </a:extLst>
           </p:cNvPr>
@@ -6321,7 +6351,7 @@
           <p:cNvPr id="3" name="TextBox 2">
             <a:extLst>
               <a:ext uri="{FF2B5EF4-FFF2-40B4-BE49-F238E27FC236}">
-                <a16:creationId xmlns:a16="http://schemas.microsoft.com/office/drawing/2014/main" id="{8279BEA5-F291-442A-8404-94C95708C808}"/>
+                <a16:creationId xmlns:a16="http://schemas.microsoft.com/office/drawing/2014/main" xmlns="" id="{8279BEA5-F291-442A-8404-94C95708C808}"/>
               </a:ext>
             </a:extLst>
           </p:cNvPr>
@@ -6361,7 +6391,7 @@
           <p:cNvPr id="4" name="TextBox 3">
             <a:extLst>
               <a:ext uri="{FF2B5EF4-FFF2-40B4-BE49-F238E27FC236}">
-                <a16:creationId xmlns:a16="http://schemas.microsoft.com/office/drawing/2014/main" id="{366BE3B8-55AE-4AB7-9730-D4FF6668CFA8}"/>
+                <a16:creationId xmlns:a16="http://schemas.microsoft.com/office/drawing/2014/main" xmlns="" id="{366BE3B8-55AE-4AB7-9730-D4FF6668CFA8}"/>
               </a:ext>
             </a:extLst>
           </p:cNvPr>
@@ -6572,7 +6602,7 @@
               <a:t>Frederick </a:t>
             </a:r>
             <a:r>
-              <a:rPr lang="en-US" sz="3600" dirty="0" err="1"/>
+              <a:rPr lang="en-US" sz="3600" dirty="0" err="1" smtClean="0"/>
               <a:t>Apina</a:t>
             </a:r>
             <a:endParaRPr sz="3600" dirty="0"/>
@@ -6593,8 +6623,30 @@
               <a:buNone/>
             </a:pPr>
             <a:r>
+              <a:rPr lang="en" dirty="0" smtClean="0"/>
+              <a:t>Machine Learning Engineer </a:t>
+            </a:r>
+            <a:r>
+              <a:rPr lang="en" smtClean="0"/>
+              <a:t>@ParrotAI</a:t>
+            </a:r>
+            <a:br>
+              <a:rPr lang="en" smtClean="0"/>
+            </a:br>
+            <a:r>
+              <a:rPr lang="en" dirty="0" smtClean="0"/>
+              <a:t/>
+            </a:r>
+            <a:br>
+              <a:rPr lang="en" dirty="0" smtClean="0"/>
+            </a:br>
+            <a:r>
+              <a:rPr lang="en" dirty="0" smtClean="0"/>
+              <a:t>I </a:t>
+            </a:r>
+            <a:r>
               <a:rPr lang="en" dirty="0"/>
-              <a:t>I am here because I love to give presentations. </a:t>
+              <a:t>am here because I love to give presentations. </a:t>
             </a:r>
             <a:endParaRPr dirty="0"/>
           </a:p>
@@ -6643,7 +6695,7 @@
           <p:cNvPr id="6" name="Google Shape;318;p42">
             <a:extLst>
               <a:ext uri="{FF2B5EF4-FFF2-40B4-BE49-F238E27FC236}">
-                <a16:creationId xmlns:a16="http://schemas.microsoft.com/office/drawing/2014/main" id="{CD000D67-FDE4-4F55-9C56-2C999D18D7BF}"/>
+                <a16:creationId xmlns:a16="http://schemas.microsoft.com/office/drawing/2014/main" xmlns="" id="{CD000D67-FDE4-4F55-9C56-2C999D18D7BF}"/>
               </a:ext>
             </a:extLst>
           </p:cNvPr>
@@ -8970,7 +9022,7 @@
           <p:cNvPr id="5" name="Picture 4">
             <a:extLst>
               <a:ext uri="{FF2B5EF4-FFF2-40B4-BE49-F238E27FC236}">
-                <a16:creationId xmlns:a16="http://schemas.microsoft.com/office/drawing/2014/main" id="{620B85CB-BA30-47F3-9EB5-1E48BBCBA22F}"/>
+                <a16:creationId xmlns:a16="http://schemas.microsoft.com/office/drawing/2014/main" xmlns="" id="{620B85CB-BA30-47F3-9EB5-1E48BBCBA22F}"/>
               </a:ext>
             </a:extLst>
           </p:cNvPr>
@@ -9000,7 +9052,7 @@
           <p:cNvPr id="6" name="TextBox 5">
             <a:extLst>
               <a:ext uri="{FF2B5EF4-FFF2-40B4-BE49-F238E27FC236}">
-                <a16:creationId xmlns:a16="http://schemas.microsoft.com/office/drawing/2014/main" id="{CD566758-6F3E-43E8-847E-E8EAD8E18D39}"/>
+                <a16:creationId xmlns:a16="http://schemas.microsoft.com/office/drawing/2014/main" xmlns="" id="{CD566758-6F3E-43E8-847E-E8EAD8E18D39}"/>
               </a:ext>
             </a:extLst>
           </p:cNvPr>
@@ -9054,7 +9106,7 @@
           <p:cNvPr id="2" name="TextBox 1">
             <a:extLst>
               <a:ext uri="{FF2B5EF4-FFF2-40B4-BE49-F238E27FC236}">
-                <a16:creationId xmlns:a16="http://schemas.microsoft.com/office/drawing/2014/main" id="{114DAEFE-2529-41F7-9455-C0BEC985CA8B}"/>
+                <a16:creationId xmlns:a16="http://schemas.microsoft.com/office/drawing/2014/main" xmlns="" id="{114DAEFE-2529-41F7-9455-C0BEC985CA8B}"/>
               </a:ext>
             </a:extLst>
           </p:cNvPr>
@@ -9124,7 +9176,7 @@
           <p:cNvPr id="5" name="Picture 4">
             <a:extLst>
               <a:ext uri="{FF2B5EF4-FFF2-40B4-BE49-F238E27FC236}">
-                <a16:creationId xmlns:a16="http://schemas.microsoft.com/office/drawing/2014/main" id="{620B85CB-BA30-47F3-9EB5-1E48BBCBA22F}"/>
+                <a16:creationId xmlns:a16="http://schemas.microsoft.com/office/drawing/2014/main" xmlns="" id="{620B85CB-BA30-47F3-9EB5-1E48BBCBA22F}"/>
               </a:ext>
             </a:extLst>
           </p:cNvPr>
@@ -9154,7 +9206,7 @@
           <p:cNvPr id="6" name="TextBox 5">
             <a:extLst>
               <a:ext uri="{FF2B5EF4-FFF2-40B4-BE49-F238E27FC236}">
-                <a16:creationId xmlns:a16="http://schemas.microsoft.com/office/drawing/2014/main" id="{CD566758-6F3E-43E8-847E-E8EAD8E18D39}"/>
+                <a16:creationId xmlns:a16="http://schemas.microsoft.com/office/drawing/2014/main" xmlns="" id="{CD566758-6F3E-43E8-847E-E8EAD8E18D39}"/>
               </a:ext>
             </a:extLst>
           </p:cNvPr>
@@ -9213,7 +9265,7 @@
           <p:cNvPr id="2" name="TextBox 1">
             <a:extLst>
               <a:ext uri="{FF2B5EF4-FFF2-40B4-BE49-F238E27FC236}">
-                <a16:creationId xmlns:a16="http://schemas.microsoft.com/office/drawing/2014/main" id="{114DAEFE-2529-41F7-9455-C0BEC985CA8B}"/>
+                <a16:creationId xmlns:a16="http://schemas.microsoft.com/office/drawing/2014/main" xmlns="" id="{114DAEFE-2529-41F7-9455-C0BEC985CA8B}"/>
               </a:ext>
             </a:extLst>
           </p:cNvPr>
@@ -9283,7 +9335,7 @@
           <p:cNvPr id="2" name="Slide Number Placeholder 1">
             <a:extLst>
               <a:ext uri="{FF2B5EF4-FFF2-40B4-BE49-F238E27FC236}">
-                <a16:creationId xmlns:a16="http://schemas.microsoft.com/office/drawing/2014/main" id="{195D5278-FF13-4996-9D14-985C83B3382C}"/>
+                <a16:creationId xmlns:a16="http://schemas.microsoft.com/office/drawing/2014/main" xmlns="" id="{195D5278-FF13-4996-9D14-985C83B3382C}"/>
               </a:ext>
             </a:extLst>
           </p:cNvPr>
@@ -9321,7 +9373,7 @@
           <p:cNvPr id="3" name="TextBox 2">
             <a:extLst>
               <a:ext uri="{FF2B5EF4-FFF2-40B4-BE49-F238E27FC236}">
-                <a16:creationId xmlns:a16="http://schemas.microsoft.com/office/drawing/2014/main" id="{410D7E3E-CB2D-4838-BB6E-17FA5F54C6AC}"/>
+                <a16:creationId xmlns:a16="http://schemas.microsoft.com/office/drawing/2014/main" xmlns="" id="{410D7E3E-CB2D-4838-BB6E-17FA5F54C6AC}"/>
               </a:ext>
             </a:extLst>
           </p:cNvPr>
@@ -9601,7 +9653,7 @@
           <p:cNvPr id="5" name="Picture 4">
             <a:extLst>
               <a:ext uri="{FF2B5EF4-FFF2-40B4-BE49-F238E27FC236}">
-                <a16:creationId xmlns:a16="http://schemas.microsoft.com/office/drawing/2014/main" id="{620B85CB-BA30-47F3-9EB5-1E48BBCBA22F}"/>
+                <a16:creationId xmlns:a16="http://schemas.microsoft.com/office/drawing/2014/main" xmlns="" id="{620B85CB-BA30-47F3-9EB5-1E48BBCBA22F}"/>
               </a:ext>
             </a:extLst>
           </p:cNvPr>
@@ -9631,7 +9683,7 @@
           <p:cNvPr id="6" name="TextBox 5">
             <a:extLst>
               <a:ext uri="{FF2B5EF4-FFF2-40B4-BE49-F238E27FC236}">
-                <a16:creationId xmlns:a16="http://schemas.microsoft.com/office/drawing/2014/main" id="{CD566758-6F3E-43E8-847E-E8EAD8E18D39}"/>
+                <a16:creationId xmlns:a16="http://schemas.microsoft.com/office/drawing/2014/main" xmlns="" id="{CD566758-6F3E-43E8-847E-E8EAD8E18D39}"/>
               </a:ext>
             </a:extLst>
           </p:cNvPr>
@@ -9775,7 +9827,7 @@
           <p:cNvPr id="5" name="Google Shape;144;p27">
             <a:extLst>
               <a:ext uri="{FF2B5EF4-FFF2-40B4-BE49-F238E27FC236}">
-                <a16:creationId xmlns:a16="http://schemas.microsoft.com/office/drawing/2014/main" id="{6F1CC948-8F35-41F5-84BF-558FD50B005B}"/>
+                <a16:creationId xmlns:a16="http://schemas.microsoft.com/office/drawing/2014/main" xmlns="" id="{6F1CC948-8F35-41F5-84BF-558FD50B005B}"/>
               </a:ext>
             </a:extLst>
           </p:cNvPr>
@@ -10061,7 +10113,7 @@
           <p:cNvPr id="8" name="Google Shape;315;p42">
             <a:extLst>
               <a:ext uri="{FF2B5EF4-FFF2-40B4-BE49-F238E27FC236}">
-                <a16:creationId xmlns:a16="http://schemas.microsoft.com/office/drawing/2014/main" id="{D13805FD-56DE-4EE2-9A9A-3BA6EA84E749}"/>
+                <a16:creationId xmlns:a16="http://schemas.microsoft.com/office/drawing/2014/main" xmlns="" id="{D13805FD-56DE-4EE2-9A9A-3BA6EA84E749}"/>
               </a:ext>
             </a:extLst>
           </p:cNvPr>
@@ -17611,7 +17663,7 @@
           <p:cNvPr id="2" name="Slide Number Placeholder 1">
             <a:extLst>
               <a:ext uri="{FF2B5EF4-FFF2-40B4-BE49-F238E27FC236}">
-                <a16:creationId xmlns:a16="http://schemas.microsoft.com/office/drawing/2014/main" id="{034AD6ED-19F7-4374-8FFE-08D8B919D61E}"/>
+                <a16:creationId xmlns:a16="http://schemas.microsoft.com/office/drawing/2014/main" xmlns="" id="{034AD6ED-19F7-4374-8FFE-08D8B919D61E}"/>
               </a:ext>
             </a:extLst>
           </p:cNvPr>
@@ -17649,7 +17701,7 @@
           <p:cNvPr id="3" name="TextBox 2">
             <a:extLst>
               <a:ext uri="{FF2B5EF4-FFF2-40B4-BE49-F238E27FC236}">
-                <a16:creationId xmlns:a16="http://schemas.microsoft.com/office/drawing/2014/main" id="{098A5BD4-7F41-413A-8EA7-D57D0C9C08F8}"/>
+                <a16:creationId xmlns:a16="http://schemas.microsoft.com/office/drawing/2014/main" xmlns="" id="{098A5BD4-7F41-413A-8EA7-D57D0C9C08F8}"/>
               </a:ext>
             </a:extLst>
           </p:cNvPr>
@@ -17717,7 +17769,7 @@
           <p:cNvPr id="4" name="TextBox 3">
             <a:extLst>
               <a:ext uri="{FF2B5EF4-FFF2-40B4-BE49-F238E27FC236}">
-                <a16:creationId xmlns:a16="http://schemas.microsoft.com/office/drawing/2014/main" id="{F369187F-BF66-436E-A423-61D5503E918B}"/>
+                <a16:creationId xmlns:a16="http://schemas.microsoft.com/office/drawing/2014/main" xmlns="" id="{F369187F-BF66-436E-A423-61D5503E918B}"/>
               </a:ext>
             </a:extLst>
           </p:cNvPr>
@@ -17823,7 +17875,7 @@
           <p:cNvPr id="4" name="Slide Number Placeholder 3">
             <a:extLst>
               <a:ext uri="{FF2B5EF4-FFF2-40B4-BE49-F238E27FC236}">
-                <a16:creationId xmlns:a16="http://schemas.microsoft.com/office/drawing/2014/main" id="{6F679221-5ED7-4628-9CD2-B0490F0478AE}"/>
+                <a16:creationId xmlns:a16="http://schemas.microsoft.com/office/drawing/2014/main" xmlns="" id="{6F679221-5ED7-4628-9CD2-B0490F0478AE}"/>
               </a:ext>
             </a:extLst>
           </p:cNvPr>
@@ -17861,7 +17913,7 @@
           <p:cNvPr id="6" name="Picture 5">
             <a:extLst>
               <a:ext uri="{FF2B5EF4-FFF2-40B4-BE49-F238E27FC236}">
-                <a16:creationId xmlns:a16="http://schemas.microsoft.com/office/drawing/2014/main" id="{5FE8A993-E166-4964-8252-AA50F288141F}"/>
+                <a16:creationId xmlns:a16="http://schemas.microsoft.com/office/drawing/2014/main" xmlns="" id="{5FE8A993-E166-4964-8252-AA50F288141F}"/>
               </a:ext>
             </a:extLst>
           </p:cNvPr>
@@ -17921,7 +17973,7 @@
           <p:cNvPr id="2" name="Slide Number Placeholder 1">
             <a:extLst>
               <a:ext uri="{FF2B5EF4-FFF2-40B4-BE49-F238E27FC236}">
-                <a16:creationId xmlns:a16="http://schemas.microsoft.com/office/drawing/2014/main" id="{23BFBB71-15B9-47CC-BE53-BAB0036E2B98}"/>
+                <a16:creationId xmlns:a16="http://schemas.microsoft.com/office/drawing/2014/main" xmlns="" id="{23BFBB71-15B9-47CC-BE53-BAB0036E2B98}"/>
               </a:ext>
             </a:extLst>
           </p:cNvPr>
@@ -17959,7 +18011,7 @@
           <p:cNvPr id="3" name="TextBox 2">
             <a:extLst>
               <a:ext uri="{FF2B5EF4-FFF2-40B4-BE49-F238E27FC236}">
-                <a16:creationId xmlns:a16="http://schemas.microsoft.com/office/drawing/2014/main" id="{DF154C39-85C9-4219-887B-3F3AFEDEBA57}"/>
+                <a16:creationId xmlns:a16="http://schemas.microsoft.com/office/drawing/2014/main" xmlns="" id="{DF154C39-85C9-4219-887B-3F3AFEDEBA57}"/>
               </a:ext>
             </a:extLst>
           </p:cNvPr>
@@ -18014,7 +18066,7 @@
           <p:cNvPr id="4" name="TextBox 3">
             <a:extLst>
               <a:ext uri="{FF2B5EF4-FFF2-40B4-BE49-F238E27FC236}">
-                <a16:creationId xmlns:a16="http://schemas.microsoft.com/office/drawing/2014/main" id="{12999F7E-07A2-48C4-A371-2D242E8E4E3F}"/>
+                <a16:creationId xmlns:a16="http://schemas.microsoft.com/office/drawing/2014/main" xmlns="" id="{12999F7E-07A2-48C4-A371-2D242E8E4E3F}"/>
               </a:ext>
             </a:extLst>
           </p:cNvPr>
@@ -18154,7 +18206,7 @@
           <p:cNvPr id="2" name="Slide Number Placeholder 1">
             <a:extLst>
               <a:ext uri="{FF2B5EF4-FFF2-40B4-BE49-F238E27FC236}">
-                <a16:creationId xmlns:a16="http://schemas.microsoft.com/office/drawing/2014/main" id="{4B66F59C-E442-44C2-9D1A-827AE6E3F49C}"/>
+                <a16:creationId xmlns:a16="http://schemas.microsoft.com/office/drawing/2014/main" xmlns="" id="{4B66F59C-E442-44C2-9D1A-827AE6E3F49C}"/>
               </a:ext>
             </a:extLst>
           </p:cNvPr>
@@ -18192,7 +18244,7 @@
           <p:cNvPr id="3" name="TextBox 2">
             <a:extLst>
               <a:ext uri="{FF2B5EF4-FFF2-40B4-BE49-F238E27FC236}">
-                <a16:creationId xmlns:a16="http://schemas.microsoft.com/office/drawing/2014/main" id="{C84D061A-57B6-4214-A0FD-CB9ABBA933D4}"/>
+                <a16:creationId xmlns:a16="http://schemas.microsoft.com/office/drawing/2014/main" xmlns="" id="{C84D061A-57B6-4214-A0FD-CB9ABBA933D4}"/>
               </a:ext>
             </a:extLst>
           </p:cNvPr>
@@ -18235,7 +18287,7 @@
           <p:cNvPr id="5" name="Picture 4">
             <a:extLst>
               <a:ext uri="{FF2B5EF4-FFF2-40B4-BE49-F238E27FC236}">
-                <a16:creationId xmlns:a16="http://schemas.microsoft.com/office/drawing/2014/main" id="{48BAA78F-BD45-4AC5-AE60-C6C374452F80}"/>
+                <a16:creationId xmlns:a16="http://schemas.microsoft.com/office/drawing/2014/main" xmlns="" id="{48BAA78F-BD45-4AC5-AE60-C6C374452F80}"/>
               </a:ext>
             </a:extLst>
           </p:cNvPr>
@@ -18295,7 +18347,7 @@
           <p:cNvPr id="2" name="Slide Number Placeholder 1">
             <a:extLst>
               <a:ext uri="{FF2B5EF4-FFF2-40B4-BE49-F238E27FC236}">
-                <a16:creationId xmlns:a16="http://schemas.microsoft.com/office/drawing/2014/main" id="{51F83D49-5874-45F1-BFA0-C25D807E3585}"/>
+                <a16:creationId xmlns:a16="http://schemas.microsoft.com/office/drawing/2014/main" xmlns="" id="{51F83D49-5874-45F1-BFA0-C25D807E3585}"/>
               </a:ext>
             </a:extLst>
           </p:cNvPr>
@@ -18333,7 +18385,7 @@
           <p:cNvPr id="3" name="TextBox 2">
             <a:extLst>
               <a:ext uri="{FF2B5EF4-FFF2-40B4-BE49-F238E27FC236}">
-                <a16:creationId xmlns:a16="http://schemas.microsoft.com/office/drawing/2014/main" id="{7399B515-F869-4712-AC6C-C1195C2C8306}"/>
+                <a16:creationId xmlns:a16="http://schemas.microsoft.com/office/drawing/2014/main" xmlns="" id="{7399B515-F869-4712-AC6C-C1195C2C8306}"/>
               </a:ext>
             </a:extLst>
           </p:cNvPr>
@@ -18365,7 +18417,7 @@
                 <a:hlinkClick r:id="rId2">
                   <a:extLst>
                     <a:ext uri="{A12FA001-AC4F-418D-AE19-62706E023703}">
-                      <ahyp:hlinkClr xmlns:ahyp="http://schemas.microsoft.com/office/drawing/2018/hyperlinkcolor" val="tx"/>
+                      <ahyp:hlinkClr xmlns:ahyp="http://schemas.microsoft.com/office/drawing/2018/hyperlinkcolor" xmlns="" val="tx"/>
                     </a:ext>
                   </a:extLst>
                 </a:hlinkClick>
@@ -18389,7 +18441,7 @@
           <p:cNvPr id="5" name="Picture 4">
             <a:extLst>
               <a:ext uri="{FF2B5EF4-FFF2-40B4-BE49-F238E27FC236}">
-                <a16:creationId xmlns:a16="http://schemas.microsoft.com/office/drawing/2014/main" id="{520EA3B9-5322-42A5-9A57-B74F4E4743B8}"/>
+                <a16:creationId xmlns:a16="http://schemas.microsoft.com/office/drawing/2014/main" xmlns="" id="{520EA3B9-5322-42A5-9A57-B74F4E4743B8}"/>
               </a:ext>
             </a:extLst>
           </p:cNvPr>

</xml_diff>